<commit_message>
Change in isuues topic - August 27th presentation
</commit_message>
<xml_diff>
--- a/Documents/RV32 CPU Design - August 27th.pptx
+++ b/Documents/RV32 CPU Design - August 27th.pptx
@@ -202,7 +202,7 @@
           <a:p>
             <a:fld id="{7669A4C7-5804-4C88-BE22-0C4427C3590B}" type="datetimeFigureOut">
               <a:rPr lang="en-US" smtClean="0"/>
-              <a:t>8/26/2023</a:t>
+              <a:t>8/27/2023</a:t>
             </a:fld>
             <a:endParaRPr lang="en-US"/>
           </a:p>
@@ -601,7 +601,7 @@
           <a:p>
             <a:fld id="{7DA67B53-14FD-401E-937A-02A387E76FC7}" type="datetime1">
               <a:rPr lang="en-US" smtClean="0"/>
-              <a:t>8/26/2023</a:t>
+              <a:t>8/27/2023</a:t>
             </a:fld>
             <a:endParaRPr lang="en-US"/>
           </a:p>
@@ -771,7 +771,7 @@
           <a:p>
             <a:fld id="{F545342A-6801-498B-8DCD-ECEF7FA84649}" type="datetime1">
               <a:rPr lang="en-US" smtClean="0"/>
-              <a:t>8/26/2023</a:t>
+              <a:t>8/27/2023</a:t>
             </a:fld>
             <a:endParaRPr lang="en-US"/>
           </a:p>
@@ -951,7 +951,7 @@
           <a:p>
             <a:fld id="{9D6303E2-CED2-43B8-8B8B-96AB17B6E689}" type="datetime1">
               <a:rPr lang="en-US" smtClean="0"/>
-              <a:t>8/26/2023</a:t>
+              <a:t>8/27/2023</a:t>
             </a:fld>
             <a:endParaRPr lang="en-US"/>
           </a:p>
@@ -1121,7 +1121,7 @@
           <a:p>
             <a:fld id="{5DB4B118-03A4-4F47-A289-6AE283DD0F52}" type="datetime1">
               <a:rPr lang="en-US" smtClean="0"/>
-              <a:t>8/26/2023</a:t>
+              <a:t>8/27/2023</a:t>
             </a:fld>
             <a:endParaRPr lang="en-US"/>
           </a:p>
@@ -1365,7 +1365,7 @@
           <a:p>
             <a:fld id="{542C2FAD-9513-4FA6-B386-3D285524CC92}" type="datetime1">
               <a:rPr lang="en-US" smtClean="0"/>
-              <a:t>8/26/2023</a:t>
+              <a:t>8/27/2023</a:t>
             </a:fld>
             <a:endParaRPr lang="en-US"/>
           </a:p>
@@ -1597,7 +1597,7 @@
           <a:p>
             <a:fld id="{A3CC088C-722A-45F0-B2F6-0EF8AC1CE7A2}" type="datetime1">
               <a:rPr lang="en-US" smtClean="0"/>
-              <a:t>8/26/2023</a:t>
+              <a:t>8/27/2023</a:t>
             </a:fld>
             <a:endParaRPr lang="en-US"/>
           </a:p>
@@ -1964,7 +1964,7 @@
           <a:p>
             <a:fld id="{6CB689DC-8DE7-406E-BC6D-647F26CF13E6}" type="datetime1">
               <a:rPr lang="en-US" smtClean="0"/>
-              <a:t>8/26/2023</a:t>
+              <a:t>8/27/2023</a:t>
             </a:fld>
             <a:endParaRPr lang="en-US"/>
           </a:p>
@@ -2082,7 +2082,7 @@
           <a:p>
             <a:fld id="{9888FC5C-E41A-49E8-A3B3-BB25F2C72DD2}" type="datetime1">
               <a:rPr lang="en-US" smtClean="0"/>
-              <a:t>8/26/2023</a:t>
+              <a:t>8/27/2023</a:t>
             </a:fld>
             <a:endParaRPr lang="en-US"/>
           </a:p>
@@ -2177,7 +2177,7 @@
           <a:p>
             <a:fld id="{C4CDF942-E420-488C-8E4E-8793FADA640D}" type="datetime1">
               <a:rPr lang="en-US" smtClean="0"/>
-              <a:t>8/26/2023</a:t>
+              <a:t>8/27/2023</a:t>
             </a:fld>
             <a:endParaRPr lang="en-US"/>
           </a:p>
@@ -2454,7 +2454,7 @@
           <a:p>
             <a:fld id="{21B24E19-3B75-4867-B13C-60E93ABEB35F}" type="datetime1">
               <a:rPr lang="en-US" smtClean="0"/>
-              <a:t>8/26/2023</a:t>
+              <a:t>8/27/2023</a:t>
             </a:fld>
             <a:endParaRPr lang="en-US"/>
           </a:p>
@@ -2711,7 +2711,7 @@
           <a:p>
             <a:fld id="{EDF3A1B6-2238-42C9-9485-9BE52BF25972}" type="datetime1">
               <a:rPr lang="en-US" smtClean="0"/>
-              <a:t>8/26/2023</a:t>
+              <a:t>8/27/2023</a:t>
             </a:fld>
             <a:endParaRPr lang="en-US"/>
           </a:p>
@@ -2924,7 +2924,7 @@
           <a:p>
             <a:fld id="{5DA4BC38-6E08-4B57-BCAC-519D639A32AE}" type="datetime1">
               <a:rPr lang="en-US" smtClean="0"/>
-              <a:t>8/26/2023</a:t>
+              <a:t>8/27/2023</a:t>
             </a:fld>
             <a:endParaRPr lang="en-US"/>
           </a:p>
@@ -3411,8 +3411,8 @@
         </p:nvSpPr>
         <p:spPr>
           <a:xfrm>
-            <a:off x="1599917" y="2140046"/>
-            <a:ext cx="5254965" cy="3139321"/>
+            <a:off x="1599116" y="2140046"/>
+            <a:ext cx="5256567" cy="3170099"/>
           </a:xfrm>
           <a:prstGeom prst="rect">
             <a:avLst/>
@@ -3466,7 +3466,7 @@
               <a:t>RV</a:t>
             </a:r>
             <a:r>
-              <a:rPr lang="en-US" sz="1800" dirty="0" smtClean="0">
+              <a:rPr lang="en-US" sz="2000" dirty="0" smtClean="0">
                 <a:latin typeface="Times New Roman" panose="02020603050405020304" pitchFamily="18" charset="0"/>
                 <a:cs typeface="Times New Roman" panose="02020603050405020304" pitchFamily="18" charset="0"/>
               </a:rPr>
@@ -10114,8 +10114,8 @@
         </p:nvSpPr>
         <p:spPr>
           <a:xfrm>
-            <a:off x="1228720" y="521912"/>
-            <a:ext cx="5523061" cy="3323987"/>
+            <a:off x="1228720" y="503440"/>
+            <a:ext cx="5523061" cy="3139321"/>
           </a:xfrm>
           <a:prstGeom prst="rect">
             <a:avLst/>
@@ -10154,7 +10154,20 @@
               <a:rPr lang="en-US" sz="1600" dirty="0" smtClean="0">
                 <a:latin typeface="Georgia" panose="02040502050405020303" pitchFamily="18" charset="0"/>
               </a:rPr>
-              <a:t>Run GCC compiler output HEX file on RV32I core</a:t>
+              <a:t>Run GCC compiler output HEX file on RV</a:t>
+            </a:r>
+            <a:r>
+              <a:rPr lang="en-US" sz="1800" dirty="0" smtClean="0">
+                <a:latin typeface="Times New Roman" panose="02020603050405020304" pitchFamily="18" charset="0"/>
+                <a:cs typeface="Times New Roman" panose="02020603050405020304" pitchFamily="18" charset="0"/>
+              </a:rPr>
+              <a:t>32</a:t>
+            </a:r>
+            <a:r>
+              <a:rPr lang="en-US" sz="1600" dirty="0" smtClean="0">
+                <a:latin typeface="Georgia" panose="02040502050405020303" pitchFamily="18" charset="0"/>
+              </a:rPr>
+              <a:t>I core</a:t>
             </a:r>
           </a:p>
           <a:p>
@@ -10166,8 +10179,17 @@
               <a:rPr lang="en-US" sz="1600" dirty="0" smtClean="0">
                 <a:latin typeface="Georgia" panose="02040502050405020303" pitchFamily="18" charset="0"/>
               </a:rPr>
-              <a:t>Add Multiplier Unit to core</a:t>
-            </a:r>
+              <a:t>Add Multiplier Unit to </a:t>
+            </a:r>
+            <a:r>
+              <a:rPr lang="en-US" sz="1600" dirty="0" smtClean="0">
+                <a:latin typeface="Georgia" panose="02040502050405020303" pitchFamily="18" charset="0"/>
+              </a:rPr>
+              <a:t>core (Approximate Multiplier)</a:t>
+            </a:r>
+            <a:endParaRPr lang="en-US" sz="1600" dirty="0" smtClean="0">
+              <a:latin typeface="Georgia" panose="02040502050405020303" pitchFamily="18" charset="0"/>
+            </a:endParaRPr>
           </a:p>
           <a:p>
             <a:pPr marL="257175" marR="31928" indent="-257175" algn="just">
@@ -10178,19 +10200,38 @@
               <a:rPr lang="en-US" sz="1600" dirty="0" smtClean="0">
                 <a:latin typeface="Georgia" panose="02040502050405020303" pitchFamily="18" charset="0"/>
               </a:rPr>
-              <a:t>Add Fixed-Point Unit to core</a:t>
-            </a:r>
-          </a:p>
-          <a:p>
-            <a:pPr marL="257175" marR="31928" indent="-257175" algn="just">
-              <a:buFont typeface="Arial" panose="020B0604020202020204" pitchFamily="34" charset="0"/>
-              <a:buChar char="•"/>
-            </a:pPr>
+              <a:t>Run </a:t>
+            </a:r>
             <a:r>
               <a:rPr lang="en-US" sz="1600" dirty="0" smtClean="0">
                 <a:latin typeface="Georgia" panose="02040502050405020303" pitchFamily="18" charset="0"/>
               </a:rPr>
-              <a:t>Run GCC compiler output HEX file on RV32IMF core</a:t>
+              <a:t>GCC compiler output HEX file on </a:t>
+            </a:r>
+            <a:r>
+              <a:rPr lang="en-US" sz="1600" dirty="0" smtClean="0">
+                <a:latin typeface="Georgia" panose="02040502050405020303" pitchFamily="18" charset="0"/>
+              </a:rPr>
+              <a:t>RV</a:t>
+            </a:r>
+            <a:r>
+              <a:rPr lang="en-US" sz="1800" dirty="0" smtClean="0">
+                <a:latin typeface="Times New Roman" panose="02020603050405020304" pitchFamily="18" charset="0"/>
+                <a:cs typeface="Times New Roman" panose="02020603050405020304" pitchFamily="18" charset="0"/>
+              </a:rPr>
+              <a:t>32</a:t>
+            </a:r>
+            <a:r>
+              <a:rPr lang="en-US" sz="1600" dirty="0" smtClean="0">
+                <a:latin typeface="Georgia" panose="02040502050405020303" pitchFamily="18" charset="0"/>
+              </a:rPr>
+              <a:t>IM </a:t>
+            </a:r>
+            <a:r>
+              <a:rPr lang="en-US" sz="1600" dirty="0" smtClean="0">
+                <a:latin typeface="Georgia" panose="02040502050405020303" pitchFamily="18" charset="0"/>
+              </a:rPr>
+              <a:t>core</a:t>
             </a:r>
             <a:endParaRPr lang="en-US" sz="1600" dirty="0">
               <a:latin typeface="Georgia" panose="02040502050405020303" pitchFamily="18" charset="0"/>
@@ -10296,8 +10337,8 @@
         </p:nvSpPr>
         <p:spPr>
           <a:xfrm>
-            <a:off x="1228720" y="4029524"/>
-            <a:ext cx="6418989" cy="2400657"/>
+            <a:off x="1228720" y="3805380"/>
+            <a:ext cx="6418989" cy="2369880"/>
           </a:xfrm>
           <a:prstGeom prst="rect">
             <a:avLst/>
@@ -10327,7 +10368,13 @@
               <a:rPr lang="en-US" sz="1600" dirty="0" smtClean="0">
                 <a:latin typeface="Georgia" panose="02040502050405020303" pitchFamily="18" charset="0"/>
               </a:rPr>
-              <a:t>Memory management system</a:t>
+              <a:t>Memory management </a:t>
+            </a:r>
+            <a:r>
+              <a:rPr lang="en-US" sz="1600" dirty="0" smtClean="0">
+                <a:latin typeface="Georgia" panose="02040502050405020303" pitchFamily="18" charset="0"/>
+              </a:rPr>
+              <a:t>system (simulation limitations)</a:t>
             </a:r>
             <a:endParaRPr lang="en-US" sz="1600" dirty="0">
               <a:latin typeface="Georgia" panose="02040502050405020303" pitchFamily="18" charset="0"/>
@@ -10348,7 +10395,19 @@
               <a:rPr lang="en-US" sz="1600" dirty="0" smtClean="0">
                 <a:latin typeface="Georgia" panose="02040502050405020303" pitchFamily="18" charset="0"/>
               </a:rPr>
-              <a:t>Standard synthetize and time analyze tool</a:t>
+              <a:t>Standard synthetize and </a:t>
+            </a:r>
+            <a:r>
+              <a:rPr lang="en-US" sz="1600" dirty="0" smtClean="0">
+                <a:latin typeface="Georgia" panose="02040502050405020303" pitchFamily="18" charset="0"/>
+              </a:rPr>
+              <a:t>static time analyze (STA) </a:t>
+            </a:r>
+            <a:r>
+              <a:rPr lang="en-US" sz="1600" dirty="0" smtClean="0">
+                <a:latin typeface="Georgia" panose="02040502050405020303" pitchFamily="18" charset="0"/>
+              </a:rPr>
+              <a:t>tool</a:t>
             </a:r>
           </a:p>
           <a:p>
@@ -10364,18 +10423,6 @@
             </a:r>
           </a:p>
           <a:p>
-            <a:pPr marL="285750" marR="31928" indent="-285750" algn="just">
-              <a:buFont typeface="Arial" panose="020B0604020202020204" pitchFamily="34" charset="0"/>
-              <a:buChar char="•"/>
-            </a:pPr>
-            <a:r>
-              <a:rPr lang="en-US" sz="1600" dirty="0" smtClean="0">
-                <a:latin typeface="Georgia" panose="02040502050405020303" pitchFamily="18" charset="0"/>
-              </a:rPr>
-              <a:t>Skywater130 and Nangate45 out of reach</a:t>
-            </a:r>
-          </a:p>
-          <a:p>
             <a:pPr marL="640571" marR="31928" lvl="1" indent="-285750" algn="just">
               <a:buFont typeface="Arial" panose="020B0604020202020204" pitchFamily="34" charset="0"/>
               <a:buChar char="•"/>
@@ -10384,7 +10431,13 @@
               <a:rPr lang="en-US" sz="1600" dirty="0" smtClean="0">
                 <a:latin typeface="Georgia" panose="02040502050405020303" pitchFamily="18" charset="0"/>
               </a:rPr>
-              <a:t>Current tools: Yosys, Qflow </a:t>
+              <a:t>Current </a:t>
+            </a:r>
+            <a:r>
+              <a:rPr lang="en-US" sz="1600" dirty="0" smtClean="0">
+                <a:latin typeface="Georgia" panose="02040502050405020303" pitchFamily="18" charset="0"/>
+              </a:rPr>
+              <a:t>tools: Yosys, Qflow </a:t>
             </a:r>
           </a:p>
           <a:p>
@@ -10396,13 +10449,26 @@
               <a:rPr lang="en-US" sz="1600" dirty="0" smtClean="0">
                 <a:latin typeface="Georgia" panose="02040502050405020303" pitchFamily="18" charset="0"/>
               </a:rPr>
-              <a:t>Non-standard technology </a:t>
+              <a:t>TSMC </a:t>
+            </a:r>
+            <a:r>
+              <a:rPr lang="en-US" sz="1600" dirty="0" smtClean="0">
+                <a:latin typeface="Times New Roman" panose="02020603050405020304" pitchFamily="18" charset="0"/>
+                <a:cs typeface="Times New Roman" panose="02020603050405020304" pitchFamily="18" charset="0"/>
+              </a:rPr>
+              <a:t>180</a:t>
             </a:r>
             <a:r>
               <a:rPr lang="en-US" sz="1600" dirty="0" smtClean="0">
                 <a:latin typeface="Georgia" panose="02040502050405020303" pitchFamily="18" charset="0"/>
               </a:rPr>
-              <a:t>(osu</a:t>
+              <a:t>nm </a:t>
+            </a:r>
+            <a:r>
+              <a:rPr lang="en-US" sz="1600" dirty="0" smtClean="0">
+                <a:latin typeface="Georgia" panose="02040502050405020303" pitchFamily="18" charset="0"/>
+              </a:rPr>
+              <a:t>technology (osu</a:t>
             </a:r>
             <a:r>
               <a:rPr lang="en-US" sz="1600" dirty="0" smtClean="0">
@@ -10427,7 +10493,34 @@
               <a:rPr lang="en-US" sz="1600" dirty="0" smtClean="0">
                 <a:latin typeface="Georgia" panose="02040502050405020303" pitchFamily="18" charset="0"/>
               </a:rPr>
-              <a:t>Standard: Cadence, Synopsys</a:t>
+              <a:t>FreePDK45: STA wrong output  + DRC error</a:t>
+            </a:r>
+            <a:endParaRPr lang="en-US" sz="1600" dirty="0" smtClean="0">
+              <a:latin typeface="Georgia" panose="02040502050405020303" pitchFamily="18" charset="0"/>
+            </a:endParaRPr>
+          </a:p>
+          <a:p>
+            <a:pPr marL="640571" marR="31928" lvl="1" indent="-285750" algn="just">
+              <a:buFont typeface="Arial" panose="020B0604020202020204" pitchFamily="34" charset="0"/>
+              <a:buChar char="•"/>
+            </a:pPr>
+            <a:r>
+              <a:rPr lang="en-US" sz="1600" dirty="0" smtClean="0">
+                <a:latin typeface="Georgia" panose="02040502050405020303" pitchFamily="18" charset="0"/>
+              </a:rPr>
+              <a:t>Standard tools: </a:t>
+            </a:r>
+            <a:r>
+              <a:rPr lang="en-US" sz="1600" dirty="0" smtClean="0">
+                <a:latin typeface="Georgia" panose="02040502050405020303" pitchFamily="18" charset="0"/>
+              </a:rPr>
+              <a:t>Cadence, </a:t>
+            </a:r>
+            <a:r>
+              <a:rPr lang="en-US" sz="1600" dirty="0" smtClean="0">
+                <a:latin typeface="Georgia" panose="02040502050405020303" pitchFamily="18" charset="0"/>
+              </a:rPr>
+              <a:t>Synopsys</a:t>
             </a:r>
           </a:p>
         </p:txBody>

</xml_diff>

<commit_message>
Finalizing August 27th presentation file
</commit_message>
<xml_diff>
--- a/Documents/RV32 CPU Design - August 27th.pptx
+++ b/Documents/RV32 CPU Design - August 27th.pptx
@@ -3430,20 +3430,11 @@
               <a:rPr lang="en-US" sz="1800" dirty="0" smtClean="0">
                 <a:latin typeface="Georgia" panose="02040502050405020303" pitchFamily="18" charset="0"/>
               </a:rPr>
-              <a:t>Updates until August 27</a:t>
-            </a:r>
-            <a:r>
-              <a:rPr lang="en-US" sz="1800" baseline="30000" dirty="0" smtClean="0">
-                <a:latin typeface="Georgia" panose="02040502050405020303" pitchFamily="18" charset="0"/>
-              </a:rPr>
-              <a:t>th</a:t>
-            </a:r>
-            <a:r>
-              <a:rPr lang="en-US" sz="1800" dirty="0" smtClean="0">
-                <a:latin typeface="Georgia" panose="02040502050405020303" pitchFamily="18" charset="0"/>
-              </a:rPr>
-              <a:t>: </a:t>
-            </a:r>
+              <a:t>Updates: </a:t>
+            </a:r>
+            <a:endParaRPr lang="en-US" sz="1800" dirty="0" smtClean="0">
+              <a:latin typeface="Georgia" panose="02040502050405020303" pitchFamily="18" charset="0"/>
+            </a:endParaRPr>
           </a:p>
           <a:p>
             <a:pPr marL="285750" indent="-285750" algn="just">
@@ -10179,17 +10170,8 @@
               <a:rPr lang="en-US" sz="1600" dirty="0" smtClean="0">
                 <a:latin typeface="Georgia" panose="02040502050405020303" pitchFamily="18" charset="0"/>
               </a:rPr>
-              <a:t>Add Multiplier Unit to </a:t>
-            </a:r>
-            <a:r>
-              <a:rPr lang="en-US" sz="1600" dirty="0" smtClean="0">
-                <a:latin typeface="Georgia" panose="02040502050405020303" pitchFamily="18" charset="0"/>
-              </a:rPr>
-              <a:t>core (Approximate Multiplier)</a:t>
-            </a:r>
-            <a:endParaRPr lang="en-US" sz="1600" dirty="0" smtClean="0">
-              <a:latin typeface="Georgia" panose="02040502050405020303" pitchFamily="18" charset="0"/>
-            </a:endParaRPr>
+              <a:t>Add Multiplier Unit to core (Approximate Multiplier)</a:t>
+            </a:r>
           </a:p>
           <a:p>
             <a:pPr marL="257175" marR="31928" indent="-257175" algn="just">
@@ -10200,19 +10182,7 @@
               <a:rPr lang="en-US" sz="1600" dirty="0" smtClean="0">
                 <a:latin typeface="Georgia" panose="02040502050405020303" pitchFamily="18" charset="0"/>
               </a:rPr>
-              <a:t>Run </a:t>
-            </a:r>
-            <a:r>
-              <a:rPr lang="en-US" sz="1600" dirty="0" smtClean="0">
-                <a:latin typeface="Georgia" panose="02040502050405020303" pitchFamily="18" charset="0"/>
-              </a:rPr>
-              <a:t>GCC compiler output HEX file on </a:t>
-            </a:r>
-            <a:r>
-              <a:rPr lang="en-US" sz="1600" dirty="0" smtClean="0">
-                <a:latin typeface="Georgia" panose="02040502050405020303" pitchFamily="18" charset="0"/>
-              </a:rPr>
-              <a:t>RV</a:t>
+              <a:t>Run GCC compiler output HEX file on RV</a:t>
             </a:r>
             <a:r>
               <a:rPr lang="en-US" sz="1800" dirty="0" smtClean="0">
@@ -10225,13 +10195,7 @@
               <a:rPr lang="en-US" sz="1600" dirty="0" smtClean="0">
                 <a:latin typeface="Georgia" panose="02040502050405020303" pitchFamily="18" charset="0"/>
               </a:rPr>
-              <a:t>IM </a:t>
-            </a:r>
-            <a:r>
-              <a:rPr lang="en-US" sz="1600" dirty="0" smtClean="0">
-                <a:latin typeface="Georgia" panose="02040502050405020303" pitchFamily="18" charset="0"/>
-              </a:rPr>
-              <a:t>core</a:t>
+              <a:t>IM core</a:t>
             </a:r>
             <a:endParaRPr lang="en-US" sz="1600" dirty="0">
               <a:latin typeface="Georgia" panose="02040502050405020303" pitchFamily="18" charset="0"/>
@@ -10338,7 +10302,7 @@
         <p:spPr>
           <a:xfrm>
             <a:off x="1228720" y="3805380"/>
-            <a:ext cx="6418989" cy="2369880"/>
+            <a:ext cx="6418989" cy="2400657"/>
           </a:xfrm>
           <a:prstGeom prst="rect">
             <a:avLst/>
@@ -10368,13 +10332,7 @@
               <a:rPr lang="en-US" sz="1600" dirty="0" smtClean="0">
                 <a:latin typeface="Georgia" panose="02040502050405020303" pitchFamily="18" charset="0"/>
               </a:rPr>
-              <a:t>Memory management </a:t>
-            </a:r>
-            <a:r>
-              <a:rPr lang="en-US" sz="1600" dirty="0" smtClean="0">
-                <a:latin typeface="Georgia" panose="02040502050405020303" pitchFamily="18" charset="0"/>
-              </a:rPr>
-              <a:t>system (simulation limitations)</a:t>
+              <a:t>Memory management system (simulation limitations)</a:t>
             </a:r>
             <a:endParaRPr lang="en-US" sz="1600" dirty="0">
               <a:latin typeface="Georgia" panose="02040502050405020303" pitchFamily="18" charset="0"/>
@@ -10395,19 +10353,7 @@
               <a:rPr lang="en-US" sz="1600" dirty="0" smtClean="0">
                 <a:latin typeface="Georgia" panose="02040502050405020303" pitchFamily="18" charset="0"/>
               </a:rPr>
-              <a:t>Standard synthetize and </a:t>
-            </a:r>
-            <a:r>
-              <a:rPr lang="en-US" sz="1600" dirty="0" smtClean="0">
-                <a:latin typeface="Georgia" panose="02040502050405020303" pitchFamily="18" charset="0"/>
-              </a:rPr>
-              <a:t>static time analyze (STA) </a:t>
-            </a:r>
-            <a:r>
-              <a:rPr lang="en-US" sz="1600" dirty="0" smtClean="0">
-                <a:latin typeface="Georgia" panose="02040502050405020303" pitchFamily="18" charset="0"/>
-              </a:rPr>
-              <a:t>tool</a:t>
+              <a:t>Standard synthetize and static time analyze (STA) tool</a:t>
             </a:r>
           </a:p>
           <a:p>
@@ -10431,13 +10377,7 @@
               <a:rPr lang="en-US" sz="1600" dirty="0" smtClean="0">
                 <a:latin typeface="Georgia" panose="02040502050405020303" pitchFamily="18" charset="0"/>
               </a:rPr>
-              <a:t>Current </a:t>
-            </a:r>
-            <a:r>
-              <a:rPr lang="en-US" sz="1600" dirty="0" smtClean="0">
-                <a:latin typeface="Georgia" panose="02040502050405020303" pitchFamily="18" charset="0"/>
-              </a:rPr>
-              <a:t>tools: Yosys, Qflow </a:t>
+              <a:t>Current tools: Yosys, Qflow </a:t>
             </a:r>
           </a:p>
           <a:p>
@@ -10462,13 +10402,7 @@
               <a:rPr lang="en-US" sz="1600" dirty="0" smtClean="0">
                 <a:latin typeface="Georgia" panose="02040502050405020303" pitchFamily="18" charset="0"/>
               </a:rPr>
-              <a:t>nm </a:t>
-            </a:r>
-            <a:r>
-              <a:rPr lang="en-US" sz="1600" dirty="0" smtClean="0">
-                <a:latin typeface="Georgia" panose="02040502050405020303" pitchFamily="18" charset="0"/>
-              </a:rPr>
-              <a:t>technology (osu</a:t>
+              <a:t>nm technology (osu</a:t>
             </a:r>
             <a:r>
               <a:rPr lang="en-US" sz="1600" dirty="0" smtClean="0">
@@ -10493,11 +10427,21 @@
               <a:rPr lang="en-US" sz="1600" dirty="0" smtClean="0">
                 <a:latin typeface="Georgia" panose="02040502050405020303" pitchFamily="18" charset="0"/>
               </a:rPr>
-              <a:t>FreePDK45: STA wrong output  + DRC error</a:t>
-            </a:r>
-            <a:endParaRPr lang="en-US" sz="1600" dirty="0" smtClean="0">
-              <a:latin typeface="Georgia" panose="02040502050405020303" pitchFamily="18" charset="0"/>
-            </a:endParaRPr>
+              <a:t>FreePDK</a:t>
+            </a:r>
+            <a:r>
+              <a:rPr lang="en-US" sz="1800" dirty="0" smtClean="0">
+                <a:latin typeface="Times New Roman" panose="02020603050405020304" pitchFamily="18" charset="0"/>
+                <a:cs typeface="Times New Roman" panose="02020603050405020304" pitchFamily="18" charset="0"/>
+              </a:rPr>
+              <a:t>45</a:t>
+            </a:r>
+            <a:r>
+              <a:rPr lang="en-US" sz="1600" dirty="0" smtClean="0">
+                <a:latin typeface="Georgia" panose="02040502050405020303" pitchFamily="18" charset="0"/>
+              </a:rPr>
+              <a:t>: STA wrong output  + DRC error</a:t>
+            </a:r>
           </a:p>
           <a:p>
             <a:pPr marL="640571" marR="31928" lvl="1" indent="-285750" algn="just">
@@ -10508,19 +10452,7 @@
               <a:rPr lang="en-US" sz="1600" dirty="0" smtClean="0">
                 <a:latin typeface="Georgia" panose="02040502050405020303" pitchFamily="18" charset="0"/>
               </a:rPr>
-              <a:t>Standard tools: </a:t>
-            </a:r>
-            <a:r>
-              <a:rPr lang="en-US" sz="1600" dirty="0" smtClean="0">
-                <a:latin typeface="Georgia" panose="02040502050405020303" pitchFamily="18" charset="0"/>
-              </a:rPr>
-              <a:t>Cadence, </a:t>
-            </a:r>
-            <a:r>
-              <a:rPr lang="en-US" sz="1600" dirty="0" smtClean="0">
-                <a:latin typeface="Georgia" panose="02040502050405020303" pitchFamily="18" charset="0"/>
-              </a:rPr>
-              <a:t>Synopsys</a:t>
+              <a:t>Standard tools: Cadence, Synopsys</a:t>
             </a:r>
           </a:p>
         </p:txBody>

</xml_diff>